<commit_message>
Actualizacion presentación y evidencia registro Nacional
</commit_message>
<xml_diff>
--- a/Documentacion/Proyecto/Presentacion JANFOX 24 Mayo 2021.pptx
+++ b/Documentacion/Proyecto/Presentacion JANFOX 24 Mayo 2021.pptx
@@ -315,7 +315,7 @@
           <a:p>
             <a:fld id="{D907A496-255F-E74A-819C-15767F033107}" type="datetimeFigureOut">
               <a:rPr lang="es-CO" smtClean="0"/>
-              <a:t>19/05/2021</a:t>
+              <a:t>21/05/2021</a:t>
             </a:fld>
             <a:endParaRPr lang="es-CO" dirty="0"/>
           </a:p>
@@ -532,7 +532,7 @@
           <a:p>
             <a:fld id="{D907A496-255F-E74A-819C-15767F033107}" type="datetimeFigureOut">
               <a:rPr lang="es-CO" smtClean="0"/>
-              <a:t>19/05/2021</a:t>
+              <a:t>21/05/2021</a:t>
             </a:fld>
             <a:endParaRPr lang="es-CO" dirty="0"/>
           </a:p>
@@ -759,7 +759,7 @@
           <a:p>
             <a:fld id="{D907A496-255F-E74A-819C-15767F033107}" type="datetimeFigureOut">
               <a:rPr lang="es-CO" smtClean="0"/>
-              <a:t>19/05/2021</a:t>
+              <a:t>21/05/2021</a:t>
             </a:fld>
             <a:endParaRPr lang="es-CO" dirty="0"/>
           </a:p>
@@ -976,7 +976,7 @@
           <a:p>
             <a:fld id="{D907A496-255F-E74A-819C-15767F033107}" type="datetimeFigureOut">
               <a:rPr lang="es-CO" smtClean="0"/>
-              <a:t>19/05/2021</a:t>
+              <a:t>21/05/2021</a:t>
             </a:fld>
             <a:endParaRPr lang="es-CO" dirty="0"/>
           </a:p>
@@ -1298,7 +1298,7 @@
           <a:p>
             <a:fld id="{D907A496-255F-E74A-819C-15767F033107}" type="datetimeFigureOut">
               <a:rPr lang="es-CO" smtClean="0"/>
-              <a:t>19/05/2021</a:t>
+              <a:t>21/05/2021</a:t>
             </a:fld>
             <a:endParaRPr lang="es-CO" dirty="0"/>
           </a:p>
@@ -1558,7 +1558,7 @@
           <a:p>
             <a:fld id="{D907A496-255F-E74A-819C-15767F033107}" type="datetimeFigureOut">
               <a:rPr lang="es-CO" smtClean="0"/>
-              <a:t>19/05/2021</a:t>
+              <a:t>21/05/2021</a:t>
             </a:fld>
             <a:endParaRPr lang="es-CO" dirty="0"/>
           </a:p>
@@ -1973,7 +1973,7 @@
           <a:p>
             <a:fld id="{D907A496-255F-E74A-819C-15767F033107}" type="datetimeFigureOut">
               <a:rPr lang="es-CO" smtClean="0"/>
-              <a:t>19/05/2021</a:t>
+              <a:t>21/05/2021</a:t>
             </a:fld>
             <a:endParaRPr lang="es-CO" dirty="0"/>
           </a:p>
@@ -2157,7 +2157,7 @@
           <a:p>
             <a:fld id="{D907A496-255F-E74A-819C-15767F033107}" type="datetimeFigureOut">
               <a:rPr lang="es-CO" smtClean="0"/>
-              <a:t>19/05/2021</a:t>
+              <a:t>21/05/2021</a:t>
             </a:fld>
             <a:endParaRPr lang="es-CO" dirty="0"/>
           </a:p>
@@ -2312,7 +2312,7 @@
           <a:p>
             <a:fld id="{D907A496-255F-E74A-819C-15767F033107}" type="datetimeFigureOut">
               <a:rPr lang="es-CO" smtClean="0"/>
-              <a:t>19/05/2021</a:t>
+              <a:t>21/05/2021</a:t>
             </a:fld>
             <a:endParaRPr lang="es-CO" dirty="0"/>
           </a:p>
@@ -2646,7 +2646,7 @@
           <a:p>
             <a:fld id="{D907A496-255F-E74A-819C-15767F033107}" type="datetimeFigureOut">
               <a:rPr lang="es-CO" smtClean="0"/>
-              <a:t>19/05/2021</a:t>
+              <a:t>21/05/2021</a:t>
             </a:fld>
             <a:endParaRPr lang="es-CO" dirty="0"/>
           </a:p>
@@ -2981,7 +2981,7 @@
           <a:p>
             <a:fld id="{D907A496-255F-E74A-819C-15767F033107}" type="datetimeFigureOut">
               <a:rPr lang="es-CO" smtClean="0"/>
-              <a:t>19/05/2021</a:t>
+              <a:t>21/05/2021</a:t>
             </a:fld>
             <a:endParaRPr lang="es-CO" dirty="0"/>
           </a:p>
@@ -3241,7 +3241,7 @@
           <a:p>
             <a:fld id="{D907A496-255F-E74A-819C-15767F033107}" type="datetimeFigureOut">
               <a:rPr lang="es-CO" smtClean="0"/>
-              <a:t>19/05/2021</a:t>
+              <a:t>21/05/2021</a:t>
             </a:fld>
             <a:endParaRPr lang="es-CO" dirty="0"/>
           </a:p>
@@ -3965,7 +3965,12 @@
             <p:ph type="title"/>
           </p:nvPr>
         </p:nvSpPr>
-        <p:spPr/>
+        <p:spPr>
+          <a:xfrm>
+            <a:off x="577515" y="456155"/>
+            <a:ext cx="10515600" cy="1325563"/>
+          </a:xfrm>
+        </p:spPr>
         <p:txBody>
           <a:bodyPr/>
           <a:lstStyle/>
@@ -4020,7 +4025,7 @@
         </p:spPr>
         <p:txBody>
           <a:bodyPr>
-            <a:normAutofit lnSpcReduction="10000"/>
+            <a:normAutofit/>
           </a:bodyPr>
           <a:lstStyle/>
           <a:p>
@@ -4028,7 +4033,7 @@
               <a:buNone/>
             </a:pPr>
             <a:r>
-              <a:rPr lang="es-ES" sz="2400" dirty="0"/>
+              <a:rPr lang="es-ES" sz="2200" dirty="0"/>
               <a:t>Los videojuegos lideran las ventas como alternativa de entretenimiento, pero no son solo eso, sino también pueden permitir el desarrollo de habilidades físicas e intelectuales. </a:t>
             </a:r>
           </a:p>
@@ -4037,7 +4042,7 @@
               <a:buNone/>
             </a:pPr>
             <a:r>
-              <a:rPr lang="es-ES" sz="2400" dirty="0"/>
+              <a:rPr lang="es-ES" sz="2200" dirty="0"/>
               <a:t>Los jugadores de videojuegos con distintas limitaciones se encuentran con algunas dificultades para disfrutarlo en su totalidad, es por esto que se evidencia que se estaría ignorando el derecho de las personas con discapacidades motoras a participar de la misma forma en que lo hacen las demás.</a:t>
             </a:r>
           </a:p>
@@ -4046,7 +4051,7 @@
               <a:buNone/>
             </a:pPr>
             <a:r>
-              <a:rPr lang="es-ES" sz="2400" dirty="0"/>
+              <a:rPr lang="es-ES" sz="2200" dirty="0"/>
               <a:t>Por lo tanto, la eliminación de barreras físicas mejora la accesibilidad a los videojuegos para las personas que sufren de discapacidad motriz.</a:t>
             </a:r>
           </a:p>
@@ -4377,7 +4382,7 @@
         </p:nvSpPr>
         <p:spPr>
           <a:xfrm>
-            <a:off x="452401" y="1780200"/>
+            <a:off x="456820" y="4282969"/>
             <a:ext cx="3180947" cy="410133"/>
           </a:xfrm>
         </p:spPr>
@@ -4426,7 +4431,7 @@
         </p:blipFill>
         <p:spPr>
           <a:xfrm>
-            <a:off x="668869" y="4569919"/>
+            <a:off x="8237005" y="2981025"/>
             <a:ext cx="3548419" cy="1858155"/>
           </a:xfrm>
           <a:prstGeom prst="rect">
@@ -4450,7 +4455,7 @@
         </p:nvSpPr>
         <p:spPr>
           <a:xfrm>
-            <a:off x="5059857" y="4112147"/>
+            <a:off x="565659" y="1687032"/>
             <a:ext cx="3317627" cy="457772"/>
           </a:xfrm>
           <a:prstGeom prst="rect">
@@ -4663,7 +4668,7 @@
         </p:blipFill>
         <p:spPr>
           <a:xfrm flipH="1">
-            <a:off x="6187915" y="2175275"/>
+            <a:off x="5554314" y="4929878"/>
             <a:ext cx="1644215" cy="1452285"/>
           </a:xfrm>
           <a:prstGeom prst="rect">
@@ -4687,7 +4692,7 @@
         </p:nvSpPr>
         <p:spPr>
           <a:xfrm>
-            <a:off x="541577" y="4112147"/>
+            <a:off x="8237005" y="2549206"/>
             <a:ext cx="2206389" cy="360642"/>
           </a:xfrm>
           <a:prstGeom prst="rect">
@@ -4889,7 +4894,7 @@
         </p:nvSpPr>
         <p:spPr>
           <a:xfrm>
-            <a:off x="5031083" y="1748591"/>
+            <a:off x="4420862" y="4307555"/>
             <a:ext cx="3431005" cy="601162"/>
           </a:xfrm>
           <a:prstGeom prst="rect">
@@ -4898,7 +4903,7 @@
         </p:spPr>
         <p:txBody>
           <a:bodyPr vert="horz" lIns="91440" tIns="45720" rIns="91440" bIns="45720" rtlCol="0">
-            <a:normAutofit fontScale="92500" lnSpcReduction="10000"/>
+            <a:normAutofit fontScale="92500"/>
           </a:bodyPr>
           <a:lstStyle>
             <a:lvl1pPr marL="228600" indent="-228600" algn="l" defTabSz="914400" rtl="0" eaLnBrk="1" latinLnBrk="0" hangingPunct="1">
@@ -5071,10 +5076,6 @@
               <a:rPr lang="es-CO" sz="2200" dirty="0"/>
               <a:t>IA - Reconocimiento de voz</a:t>
             </a:r>
-            <a:br>
-              <a:rPr lang="es-CO" sz="2200" dirty="0"/>
-            </a:br>
-            <a:endParaRPr lang="es-CO" sz="2200" dirty="0"/>
           </a:p>
           <a:p>
             <a:pPr marL="0" indent="0">
@@ -5100,7 +5101,7 @@
         </p:nvSpPr>
         <p:spPr>
           <a:xfrm>
-            <a:off x="9396992" y="2599810"/>
+            <a:off x="5117673" y="1662175"/>
             <a:ext cx="1956654" cy="457772"/>
           </a:xfrm>
           <a:prstGeom prst="rect">
@@ -5313,7 +5314,7 @@
         </p:blipFill>
         <p:spPr>
           <a:xfrm>
-            <a:off x="9396992" y="3152102"/>
+            <a:off x="5117673" y="2083516"/>
             <a:ext cx="2349057" cy="1571575"/>
           </a:xfrm>
           <a:prstGeom prst="rect">
@@ -5357,7 +5358,7 @@
         </p:blipFill>
         <p:spPr bwMode="auto">
           <a:xfrm>
-            <a:off x="9250975" y="4338666"/>
+            <a:off x="4934534" y="3238027"/>
             <a:ext cx="1002852" cy="672075"/>
           </a:xfrm>
           <a:prstGeom prst="rect">
@@ -5402,7 +5403,7 @@
         </p:blipFill>
         <p:spPr bwMode="auto">
           <a:xfrm>
-            <a:off x="5609008" y="4365342"/>
+            <a:off x="1114810" y="1940227"/>
             <a:ext cx="2832334" cy="1858155"/>
           </a:xfrm>
           <a:prstGeom prst="rect">
@@ -5449,7 +5450,7 @@
         </p:blipFill>
         <p:spPr bwMode="auto">
           <a:xfrm>
-            <a:off x="992815" y="2287463"/>
+            <a:off x="744571" y="4866489"/>
             <a:ext cx="2786549" cy="1515674"/>
           </a:xfrm>
           <a:prstGeom prst="rect">
@@ -5639,13 +5640,18 @@
         </p:blipFill>
         <p:spPr bwMode="auto">
           <a:xfrm>
-            <a:off x="1030104" y="1651533"/>
-            <a:ext cx="3865145" cy="2353132"/>
+            <a:off x="1313512" y="1500229"/>
+            <a:ext cx="3581737" cy="2180591"/>
           </a:xfrm>
           <a:prstGeom prst="rect">
             <a:avLst/>
           </a:prstGeom>
           <a:noFill/>
+          <a:ln>
+            <a:solidFill>
+              <a:schemeClr val="tx1"/>
+            </a:solidFill>
+          </a:ln>
           <a:extLst>
             <a:ext uri="{909E8E84-426E-40DD-AFC4-6F175D3DCCD1}">
               <a14:hiddenFill xmlns:a14="http://schemas.microsoft.com/office/drawing/2010/main">
@@ -5677,8 +5683,8 @@
         </p:blipFill>
         <p:spPr>
           <a:xfrm>
-            <a:off x="6323029" y="1408196"/>
-            <a:ext cx="3421380" cy="2082165"/>
+            <a:off x="6527566" y="1500229"/>
+            <a:ext cx="3827078" cy="2180591"/>
           </a:xfrm>
           <a:prstGeom prst="rect">
             <a:avLst/>
@@ -5710,7 +5716,7 @@
         </p:blipFill>
         <p:spPr>
           <a:xfrm>
-            <a:off x="1668379" y="4343825"/>
+            <a:off x="1313512" y="4111942"/>
             <a:ext cx="3593465" cy="2180590"/>
           </a:xfrm>
           <a:prstGeom prst="rect">
@@ -5749,8 +5755,8 @@
         </p:blipFill>
         <p:spPr>
           <a:xfrm>
-            <a:off x="6323029" y="3911600"/>
-            <a:ext cx="4031615" cy="2581275"/>
+            <a:off x="6527566" y="4111943"/>
+            <a:ext cx="3827078" cy="2180590"/>
           </a:xfrm>
           <a:prstGeom prst="rect">
             <a:avLst/>
@@ -5876,13 +5882,13 @@
   <p:clrMapOvr>
     <a:masterClrMapping/>
   </p:clrMapOvr>
-  <mc:AlternateContent xmlns:mc="http://schemas.openxmlformats.org/markup-compatibility/2006">
-    <mc:Choice xmlns:p14="http://schemas.microsoft.com/office/powerpoint/2010/main" Requires="p14">
+  <mc:AlternateContent xmlns:mc="http://schemas.openxmlformats.org/markup-compatibility/2006" xmlns:p14="http://schemas.microsoft.com/office/powerpoint/2010/main">
+    <mc:Choice Requires="p14">
       <p:transition spd="slow" p14:dur="1200">
         <p14:prism/>
       </p:transition>
     </mc:Choice>
-    <mc:Fallback>
+    <mc:Fallback xmlns="">
       <p:transition spd="slow">
         <p:fade/>
       </p:transition>
@@ -5940,31 +5946,179 @@
           </a:p>
         </p:txBody>
       </p:sp>
-      <p:sp>
-        <p:nvSpPr>
-          <p:cNvPr id="3" name="Marcador de contenido 2">
-            <a:extLst>
-              <a:ext uri="{FF2B5EF4-FFF2-40B4-BE49-F238E27FC236}">
-                <a16:creationId xmlns:a16="http://schemas.microsoft.com/office/drawing/2014/main" id="{A381A5C4-CF7F-6444-830B-54E7103EEE10}"/>
-              </a:ext>
-            </a:extLst>
-          </p:cNvPr>
-          <p:cNvSpPr>
-            <a:spLocks noGrp="1"/>
-          </p:cNvSpPr>
+      <p:pic>
+        <p:nvPicPr>
+          <p:cNvPr id="7" name="Marcador de contenido 6">
+            <a:extLst>
+              <a:ext uri="{FF2B5EF4-FFF2-40B4-BE49-F238E27FC236}">
+                <a16:creationId xmlns:a16="http://schemas.microsoft.com/office/drawing/2014/main" id="{D1CA4374-C5EE-4D53-9A20-62A1039C3D83}"/>
+              </a:ext>
+            </a:extLst>
+          </p:cNvPr>
+          <p:cNvPicPr>
+            <a:picLocks noGrp="1" noChangeAspect="1"/>
+          </p:cNvPicPr>
           <p:nvPr>
             <p:ph idx="1"/>
           </p:nvPr>
-        </p:nvSpPr>
-        <p:spPr/>
-        <p:txBody>
-          <a:bodyPr/>
-          <a:lstStyle/>
-          <a:p>
-            <a:endParaRPr lang="es-CO" dirty="0"/>
-          </a:p>
-        </p:txBody>
-      </p:sp>
+        </p:nvPicPr>
+        <p:blipFill>
+          <a:blip r:embed="rId2"/>
+          <a:stretch>
+            <a:fillRect/>
+          </a:stretch>
+        </p:blipFill>
+        <p:spPr>
+          <a:xfrm>
+            <a:off x="6288504" y="1409327"/>
+            <a:ext cx="2617348" cy="1659846"/>
+          </a:xfrm>
+          <a:ln>
+            <a:solidFill>
+              <a:schemeClr val="tx1"/>
+            </a:solidFill>
+          </a:ln>
+        </p:spPr>
+      </p:pic>
+      <p:pic>
+        <p:nvPicPr>
+          <p:cNvPr id="5" name="Imagen 4">
+            <a:extLst>
+              <a:ext uri="{FF2B5EF4-FFF2-40B4-BE49-F238E27FC236}">
+                <a16:creationId xmlns:a16="http://schemas.microsoft.com/office/drawing/2014/main" id="{BCF17472-02A6-45C8-9099-1E9DC561E193}"/>
+              </a:ext>
+            </a:extLst>
+          </p:cNvPr>
+          <p:cNvPicPr>
+            <a:picLocks noChangeAspect="1"/>
+          </p:cNvPicPr>
+          <p:nvPr/>
+        </p:nvPicPr>
+        <p:blipFill rotWithShape="1">
+          <a:blip r:embed="rId3"/>
+          <a:srcRect t="976"/>
+          <a:stretch/>
+        </p:blipFill>
+        <p:spPr>
+          <a:xfrm>
+            <a:off x="402163" y="2056337"/>
+            <a:ext cx="5501335" cy="3431987"/>
+          </a:xfrm>
+          <a:prstGeom prst="rect">
+            <a:avLst/>
+          </a:prstGeom>
+          <a:ln>
+            <a:solidFill>
+              <a:schemeClr val="tx1"/>
+            </a:solidFill>
+          </a:ln>
+        </p:spPr>
+      </p:pic>
+      <p:pic>
+        <p:nvPicPr>
+          <p:cNvPr id="9" name="Imagen 8">
+            <a:extLst>
+              <a:ext uri="{FF2B5EF4-FFF2-40B4-BE49-F238E27FC236}">
+                <a16:creationId xmlns:a16="http://schemas.microsoft.com/office/drawing/2014/main" id="{2327254C-693C-400A-B069-07AD5DC9C34F}"/>
+              </a:ext>
+            </a:extLst>
+          </p:cNvPr>
+          <p:cNvPicPr>
+            <a:picLocks noChangeAspect="1"/>
+          </p:cNvPicPr>
+          <p:nvPr/>
+        </p:nvPicPr>
+        <p:blipFill>
+          <a:blip r:embed="rId4"/>
+          <a:stretch>
+            <a:fillRect/>
+          </a:stretch>
+        </p:blipFill>
+        <p:spPr>
+          <a:xfrm>
+            <a:off x="9331216" y="2025332"/>
+            <a:ext cx="2458621" cy="1532679"/>
+          </a:xfrm>
+          <a:prstGeom prst="rect">
+            <a:avLst/>
+          </a:prstGeom>
+          <a:ln>
+            <a:solidFill>
+              <a:schemeClr val="tx1"/>
+            </a:solidFill>
+          </a:ln>
+        </p:spPr>
+      </p:pic>
+      <p:pic>
+        <p:nvPicPr>
+          <p:cNvPr id="13" name="Imagen 12">
+            <a:extLst>
+              <a:ext uri="{FF2B5EF4-FFF2-40B4-BE49-F238E27FC236}">
+                <a16:creationId xmlns:a16="http://schemas.microsoft.com/office/drawing/2014/main" id="{B7EFE1E5-81FB-42B7-BB16-234241390D9B}"/>
+              </a:ext>
+            </a:extLst>
+          </p:cNvPr>
+          <p:cNvPicPr>
+            <a:picLocks noChangeAspect="1"/>
+          </p:cNvPicPr>
+          <p:nvPr/>
+        </p:nvPicPr>
+        <p:blipFill>
+          <a:blip r:embed="rId5"/>
+          <a:stretch>
+            <a:fillRect/>
+          </a:stretch>
+        </p:blipFill>
+        <p:spPr>
+          <a:xfrm>
+            <a:off x="6272102" y="3788828"/>
+            <a:ext cx="2633750" cy="1647406"/>
+          </a:xfrm>
+          <a:prstGeom prst="rect">
+            <a:avLst/>
+          </a:prstGeom>
+          <a:ln>
+            <a:solidFill>
+              <a:schemeClr val="tx1"/>
+            </a:solidFill>
+          </a:ln>
+        </p:spPr>
+      </p:pic>
+      <p:pic>
+        <p:nvPicPr>
+          <p:cNvPr id="15" name="Imagen 14">
+            <a:extLst>
+              <a:ext uri="{FF2B5EF4-FFF2-40B4-BE49-F238E27FC236}">
+                <a16:creationId xmlns:a16="http://schemas.microsoft.com/office/drawing/2014/main" id="{749A9F5D-41C3-44DF-9A00-661B512C27B7}"/>
+              </a:ext>
+            </a:extLst>
+          </p:cNvPr>
+          <p:cNvPicPr>
+            <a:picLocks noChangeAspect="1"/>
+          </p:cNvPicPr>
+          <p:nvPr/>
+        </p:nvPicPr>
+        <p:blipFill>
+          <a:blip r:embed="rId6"/>
+          <a:stretch>
+            <a:fillRect/>
+          </a:stretch>
+        </p:blipFill>
+        <p:spPr>
+          <a:xfrm>
+            <a:off x="9251129" y="4447658"/>
+            <a:ext cx="2458621" cy="1548387"/>
+          </a:xfrm>
+          <a:prstGeom prst="rect">
+            <a:avLst/>
+          </a:prstGeom>
+          <a:ln>
+            <a:solidFill>
+              <a:schemeClr val="tx1"/>
+            </a:solidFill>
+          </a:ln>
+        </p:spPr>
+      </p:pic>
     </p:spTree>
     <p:extLst>
       <p:ext uri="{BB962C8B-B14F-4D97-AF65-F5344CB8AC3E}">

</xml_diff>